<commit_message>
update figures for submission
</commit_message>
<xml_diff>
--- a/outputs/Figures papier/Figure3.pptx
+++ b/outputs/Figures papier/Figure3.pptx
@@ -104,6 +104,11 @@
       </a:defRPr>
     </a:lvl9pPr>
   </p:defaultTextStyle>
+  <p:extLst>
+    <p:ext uri="{EFAFB233-063F-42B5-8137-9DF3F51BA10A}">
+      <p15:sldGuideLst xmlns:p15="http://schemas.microsoft.com/office/powerpoint/2012/main"/>
+    </p:ext>
+  </p:extLst>
 </p:presentation>
 </file>
 
@@ -238,7 +243,7 @@
           <a:p>
             <a:fld id="{CF97A134-FB87-44B0-94D1-6D4AE8ED7871}" type="datetimeFigureOut">
               <a:rPr lang="fr-FR" smtClean="0"/>
-              <a:t>26/07/2020</a:t>
+              <a:t>26/08/2020</a:t>
             </a:fld>
             <a:endParaRPr lang="fr-FR"/>
           </a:p>
@@ -408,7 +413,7 @@
           <a:p>
             <a:fld id="{CF97A134-FB87-44B0-94D1-6D4AE8ED7871}" type="datetimeFigureOut">
               <a:rPr lang="fr-FR" smtClean="0"/>
-              <a:t>26/07/2020</a:t>
+              <a:t>26/08/2020</a:t>
             </a:fld>
             <a:endParaRPr lang="fr-FR"/>
           </a:p>
@@ -588,7 +593,7 @@
           <a:p>
             <a:fld id="{CF97A134-FB87-44B0-94D1-6D4AE8ED7871}" type="datetimeFigureOut">
               <a:rPr lang="fr-FR" smtClean="0"/>
-              <a:t>26/07/2020</a:t>
+              <a:t>26/08/2020</a:t>
             </a:fld>
             <a:endParaRPr lang="fr-FR"/>
           </a:p>
@@ -758,7 +763,7 @@
           <a:p>
             <a:fld id="{CF97A134-FB87-44B0-94D1-6D4AE8ED7871}" type="datetimeFigureOut">
               <a:rPr lang="fr-FR" smtClean="0"/>
-              <a:t>26/07/2020</a:t>
+              <a:t>26/08/2020</a:t>
             </a:fld>
             <a:endParaRPr lang="fr-FR"/>
           </a:p>
@@ -1002,7 +1007,7 @@
           <a:p>
             <a:fld id="{CF97A134-FB87-44B0-94D1-6D4AE8ED7871}" type="datetimeFigureOut">
               <a:rPr lang="fr-FR" smtClean="0"/>
-              <a:t>26/07/2020</a:t>
+              <a:t>26/08/2020</a:t>
             </a:fld>
             <a:endParaRPr lang="fr-FR"/>
           </a:p>
@@ -1234,7 +1239,7 @@
           <a:p>
             <a:fld id="{CF97A134-FB87-44B0-94D1-6D4AE8ED7871}" type="datetimeFigureOut">
               <a:rPr lang="fr-FR" smtClean="0"/>
-              <a:t>26/07/2020</a:t>
+              <a:t>26/08/2020</a:t>
             </a:fld>
             <a:endParaRPr lang="fr-FR"/>
           </a:p>
@@ -1601,7 +1606,7 @@
           <a:p>
             <a:fld id="{CF97A134-FB87-44B0-94D1-6D4AE8ED7871}" type="datetimeFigureOut">
               <a:rPr lang="fr-FR" smtClean="0"/>
-              <a:t>26/07/2020</a:t>
+              <a:t>26/08/2020</a:t>
             </a:fld>
             <a:endParaRPr lang="fr-FR"/>
           </a:p>
@@ -1719,7 +1724,7 @@
           <a:p>
             <a:fld id="{CF97A134-FB87-44B0-94D1-6D4AE8ED7871}" type="datetimeFigureOut">
               <a:rPr lang="fr-FR" smtClean="0"/>
-              <a:t>26/07/2020</a:t>
+              <a:t>26/08/2020</a:t>
             </a:fld>
             <a:endParaRPr lang="fr-FR"/>
           </a:p>
@@ -1814,7 +1819,7 @@
           <a:p>
             <a:fld id="{CF97A134-FB87-44B0-94D1-6D4AE8ED7871}" type="datetimeFigureOut">
               <a:rPr lang="fr-FR" smtClean="0"/>
-              <a:t>26/07/2020</a:t>
+              <a:t>26/08/2020</a:t>
             </a:fld>
             <a:endParaRPr lang="fr-FR"/>
           </a:p>
@@ -2091,7 +2096,7 @@
           <a:p>
             <a:fld id="{CF97A134-FB87-44B0-94D1-6D4AE8ED7871}" type="datetimeFigureOut">
               <a:rPr lang="fr-FR" smtClean="0"/>
-              <a:t>26/07/2020</a:t>
+              <a:t>26/08/2020</a:t>
             </a:fld>
             <a:endParaRPr lang="fr-FR"/>
           </a:p>
@@ -2348,7 +2353,7 @@
           <a:p>
             <a:fld id="{CF97A134-FB87-44B0-94D1-6D4AE8ED7871}" type="datetimeFigureOut">
               <a:rPr lang="fr-FR" smtClean="0"/>
-              <a:t>26/07/2020</a:t>
+              <a:t>26/08/2020</a:t>
             </a:fld>
             <a:endParaRPr lang="fr-FR"/>
           </a:p>
@@ -2561,7 +2566,7 @@
           <a:p>
             <a:fld id="{CF97A134-FB87-44B0-94D1-6D4AE8ED7871}" type="datetimeFigureOut">
               <a:rPr lang="fr-FR" smtClean="0"/>
-              <a:t>26/07/2020</a:t>
+              <a:t>26/08/2020</a:t>
             </a:fld>
             <a:endParaRPr lang="fr-FR"/>
           </a:p>
@@ -2968,7 +2973,7 @@
       </p:grpSpPr>
       <p:grpSp>
         <p:nvGrpSpPr>
-          <p:cNvPr id="11" name="Groupe 10"/>
+          <p:cNvPr id="2" name="Groupe 1"/>
           <p:cNvGrpSpPr/>
           <p:nvPr/>
         </p:nvGrpSpPr>

</xml_diff>